<commit_message>
master server version 0.9.0
</commit_message>
<xml_diff>
--- a/poster/varastorobo_poster_nyman.pptx
+++ b/poster/varastorobo_poster_nyman.pptx
@@ -580,7 +580,7 @@
             <a:fld id="{19EC9BF0-2C59-2C46-BBD9-7948B59DC01B}" type="datetime1">
               <a:rPr lang="fi-FI" smtClean="0"/>
               <a:pPr/>
-              <a:t>3.12.2019</a:t>
+              <a:t>4.12.2019</a:t>
             </a:fld>
             <a:endParaRPr lang="fi-FI"/>
           </a:p>
@@ -748,7 +748,7 @@
             <a:fld id="{0E4AA8A8-4D46-BD40-89BF-70B4CBE4D6DF}" type="datetime1">
               <a:rPr lang="fi-FI" smtClean="0"/>
               <a:pPr/>
-              <a:t>3.12.2019</a:t>
+              <a:t>4.12.2019</a:t>
             </a:fld>
             <a:endParaRPr lang="fi-FI"/>
           </a:p>
@@ -2879,26 +2879,6 @@
             <a:endParaRPr lang="en-US" dirty="0"/>
           </a:p>
           <a:p>
-            <a:r>
-              <a:rPr lang="en-US" dirty="0"/>
-              <a:t>De </a:t>
-            </a:r>
-            <a:r>
-              <a:rPr lang="en-US" dirty="0" err="1"/>
-              <a:t>devicies</a:t>
-            </a:r>
-            <a:r>
-              <a:rPr lang="en-US" dirty="0"/>
-              <a:t> communicates TCP IP</a:t>
-            </a:r>
-          </a:p>
-          <a:p>
-            <a:r>
-              <a:rPr lang="en-US" dirty="0"/>
-              <a:t>Ver for</a:t>
-            </a:r>
-          </a:p>
-          <a:p>
             <a:endParaRPr lang="en-US" dirty="0"/>
           </a:p>
           <a:p>
@@ -2915,10 +2895,9 @@
           </a:p>
           <a:p>
             <a:r>
-              <a:rPr lang="en-US"/>
+              <a:rPr lang="en-US" dirty="0"/>
               <a:t>VERY NICE]</a:t>
             </a:r>
-            <a:endParaRPr lang="en-US" dirty="0"/>
           </a:p>
           <a:p>
             <a:endParaRPr lang="fi-FI" dirty="0"/>
@@ -4059,9 +4038,12 @@
 </file>
 
 <file path=customXml/item1.xml><?xml version="1.0" encoding="utf-8"?>
-<p:properties xmlns:p="http://schemas.microsoft.com/office/2006/metadata/properties" xmlns:xsi="http://www.w3.org/2001/XMLSchema-instance" xmlns:pc="http://schemas.microsoft.com/office/infopath/2007/PartnerControls">
-  <documentManagement/>
-</p:properties>
+<?mso-contentType ?>
+<FormTemplates xmlns="http://schemas.microsoft.com/sharepoint/v3/contenttype/forms">
+  <Display>DocumentLibraryForm</Display>
+  <Edit>DocumentLibraryForm</Edit>
+  <New>DocumentLibraryForm</New>
+</FormTemplates>
 </file>
 
 <file path=customXml/item2.xml><?xml version="1.0" encoding="utf-8"?>
@@ -4217,26 +4199,15 @@
 </file>
 
 <file path=customXml/item3.xml><?xml version="1.0" encoding="utf-8"?>
-<?mso-contentType ?>
-<FormTemplates xmlns="http://schemas.microsoft.com/sharepoint/v3/contenttype/forms">
-  <Display>DocumentLibraryForm</Display>
-  <Edit>DocumentLibraryForm</Edit>
-  <New>DocumentLibraryForm</New>
-</FormTemplates>
+<p:properties xmlns:p="http://schemas.microsoft.com/office/2006/metadata/properties" xmlns:xsi="http://www.w3.org/2001/XMLSchema-instance" xmlns:pc="http://schemas.microsoft.com/office/infopath/2007/PartnerControls">
+  <documentManagement/>
+</p:properties>
 </file>
 
 <file path=customXml/itemProps1.xml><?xml version="1.0" encoding="utf-8"?>
-<ds:datastoreItem xmlns:ds="http://schemas.openxmlformats.org/officeDocument/2006/customXml" ds:itemID="{5E8E0F72-FEBC-47B1-AB6C-D6ECF4EB2481}">
+<ds:datastoreItem xmlns:ds="http://schemas.openxmlformats.org/officeDocument/2006/customXml" ds:itemID="{E91F8943-9707-4090-BD36-37E33C8D0A92}">
   <ds:schemaRefs>
-    <ds:schemaRef ds:uri="http://schemas.microsoft.com/office/infopath/2007/PartnerControls"/>
-    <ds:schemaRef ds:uri="28debcd4-39cb-438e-8b7f-bfdcd8401b5c"/>
-    <ds:schemaRef ds:uri="http://purl.org/dc/dcmitype/"/>
-    <ds:schemaRef ds:uri="http://purl.org/dc/elements/1.1/"/>
-    <ds:schemaRef ds:uri="http://www.w3.org/XML/1998/namespace"/>
-    <ds:schemaRef ds:uri="http://schemas.microsoft.com/office/2006/documentManagement/types"/>
-    <ds:schemaRef ds:uri="http://purl.org/dc/terms/"/>
-    <ds:schemaRef ds:uri="http://schemas.openxmlformats.org/package/2006/metadata/core-properties"/>
-    <ds:schemaRef ds:uri="http://schemas.microsoft.com/office/2006/metadata/properties"/>
+    <ds:schemaRef ds:uri="http://schemas.microsoft.com/sharepoint/v3/contenttype/forms"/>
   </ds:schemaRefs>
 </ds:datastoreItem>
 </file>
@@ -4260,9 +4231,17 @@
 </file>
 
 <file path=customXml/itemProps3.xml><?xml version="1.0" encoding="utf-8"?>
-<ds:datastoreItem xmlns:ds="http://schemas.openxmlformats.org/officeDocument/2006/customXml" ds:itemID="{E91F8943-9707-4090-BD36-37E33C8D0A92}">
+<ds:datastoreItem xmlns:ds="http://schemas.openxmlformats.org/officeDocument/2006/customXml" ds:itemID="{5E8E0F72-FEBC-47B1-AB6C-D6ECF4EB2481}">
   <ds:schemaRefs>
-    <ds:schemaRef ds:uri="http://schemas.microsoft.com/sharepoint/v3/contenttype/forms"/>
+    <ds:schemaRef ds:uri="http://schemas.microsoft.com/office/infopath/2007/PartnerControls"/>
+    <ds:schemaRef ds:uri="28debcd4-39cb-438e-8b7f-bfdcd8401b5c"/>
+    <ds:schemaRef ds:uri="http://purl.org/dc/dcmitype/"/>
+    <ds:schemaRef ds:uri="http://purl.org/dc/elements/1.1/"/>
+    <ds:schemaRef ds:uri="http://www.w3.org/XML/1998/namespace"/>
+    <ds:schemaRef ds:uri="http://schemas.microsoft.com/office/2006/documentManagement/types"/>
+    <ds:schemaRef ds:uri="http://purl.org/dc/terms/"/>
+    <ds:schemaRef ds:uri="http://schemas.openxmlformats.org/package/2006/metadata/core-properties"/>
+    <ds:schemaRef ds:uri="http://schemas.microsoft.com/office/2006/metadata/properties"/>
   </ds:schemaRefs>
 </ds:datastoreItem>
 </file>
</xml_diff>

<commit_message>
master server version 0.9.3
</commit_message>
<xml_diff>
--- a/poster/varastorobo_poster_nyman.pptx
+++ b/poster/varastorobo_poster_nyman.pptx
@@ -132,10 +132,7 @@
 <file path=ppt/revisionInfo.xml><?xml version="1.0" encoding="utf-8"?>
 <p1510:revInfo xmlns:a="http://schemas.openxmlformats.org/drawingml/2006/main" xmlns:r="http://schemas.openxmlformats.org/officeDocument/2006/relationships" xmlns:p1510="http://schemas.microsoft.com/office/powerpoint/2015/10/main">
   <p1510:revLst>
-    <p1510:client id="{7973B60B-7EA7-415D-955A-9004C881AFFF}" v="512" dt="2019-12-03T09:32:37.308"/>
-    <p1510:client id="{99A65CCE-A7B3-4795-8FDE-27A301F2E110}" v="477" dt="2019-12-03T10:37:08.152"/>
-    <p1510:client id="{D518F140-9D47-4F18-8BA5-1A86A95FD7AA}" v="1367" dt="2019-12-03T13:29:29.951"/>
-    <p1510:client id="{DD10AE24-A6CC-4F5B-8A7C-E738E24EF7A7}" v="65" dt="2019-12-03T08:34:53.334"/>
+    <p1510:client id="{D88D4DC1-78E0-40D2-AFEE-DA675AEAF22C}" v="11" dt="2019-12-09T07:38:35.516"/>
   </p1510:revLst>
 </p1510:revInfo>
 </file>
@@ -185,70 +182,6 @@
             <pc:docMk/>
             <pc:sldMk cId="0" sldId="265"/>
             <ac:picMk id="15" creationId="{9520CE52-36D4-4C6C-83F8-1AFA61748F5B}"/>
-          </ac:picMkLst>
-        </pc:picChg>
-      </pc:sldChg>
-    </pc:docChg>
-  </pc:docChgLst>
-  <pc:docChgLst>
-    <pc:chgData name="Wille Hyyryläinen" userId="S::t8hywi00@students.oamk.fi::9fbfb569-63a4-4b65-b166-7e5bac470419" providerId="AD" clId="Web-{7973B60B-7EA7-415D-955A-9004C881AFFF}"/>
-    <pc:docChg chg="modSld">
-      <pc:chgData name="Wille Hyyryläinen" userId="S::t8hywi00@students.oamk.fi::9fbfb569-63a4-4b65-b166-7e5bac470419" providerId="AD" clId="Web-{7973B60B-7EA7-415D-955A-9004C881AFFF}" dt="2019-12-03T09:32:37.308" v="497" actId="14100"/>
-      <pc:docMkLst>
-        <pc:docMk/>
-      </pc:docMkLst>
-      <pc:sldChg chg="addSp delSp modSp">
-        <pc:chgData name="Wille Hyyryläinen" userId="S::t8hywi00@students.oamk.fi::9fbfb569-63a4-4b65-b166-7e5bac470419" providerId="AD" clId="Web-{7973B60B-7EA7-415D-955A-9004C881AFFF}" dt="2019-12-03T09:32:37.308" v="497" actId="14100"/>
-        <pc:sldMkLst>
-          <pc:docMk/>
-          <pc:sldMk cId="0" sldId="265"/>
-        </pc:sldMkLst>
-        <pc:spChg chg="mod">
-          <ac:chgData name="Wille Hyyryläinen" userId="S::t8hywi00@students.oamk.fi::9fbfb569-63a4-4b65-b166-7e5bac470419" providerId="AD" clId="Web-{7973B60B-7EA7-415D-955A-9004C881AFFF}" dt="2019-12-03T09:14:33.962" v="1" actId="1076"/>
-          <ac:spMkLst>
-            <pc:docMk/>
-            <pc:sldMk cId="0" sldId="265"/>
-            <ac:spMk id="4" creationId="{00000000-0000-0000-0000-000000000000}"/>
-          </ac:spMkLst>
-        </pc:spChg>
-        <pc:spChg chg="mod">
-          <ac:chgData name="Wille Hyyryläinen" userId="S::t8hywi00@students.oamk.fi::9fbfb569-63a4-4b65-b166-7e5bac470419" providerId="AD" clId="Web-{7973B60B-7EA7-415D-955A-9004C881AFFF}" dt="2019-12-03T09:27:45.417" v="493" actId="20577"/>
-          <ac:spMkLst>
-            <pc:docMk/>
-            <pc:sldMk cId="0" sldId="265"/>
-            <ac:spMk id="9" creationId="{00000000-0000-0000-0000-000000000000}"/>
-          </ac:spMkLst>
-        </pc:spChg>
-        <pc:spChg chg="mod">
-          <ac:chgData name="Wille Hyyryläinen" userId="S::t8hywi00@students.oamk.fi::9fbfb569-63a4-4b65-b166-7e5bac470419" providerId="AD" clId="Web-{7973B60B-7EA7-415D-955A-9004C881AFFF}" dt="2019-12-03T09:27:04.135" v="490" actId="20577"/>
-          <ac:spMkLst>
-            <pc:docMk/>
-            <pc:sldMk cId="0" sldId="265"/>
-            <ac:spMk id="10" creationId="{00000000-0000-0000-0000-000000000000}"/>
-          </ac:spMkLst>
-        </pc:spChg>
-        <pc:picChg chg="add mod">
-          <ac:chgData name="Wille Hyyryläinen" userId="S::t8hywi00@students.oamk.fi::9fbfb569-63a4-4b65-b166-7e5bac470419" providerId="AD" clId="Web-{7973B60B-7EA7-415D-955A-9004C881AFFF}" dt="2019-12-03T09:32:37.308" v="497" actId="14100"/>
-          <ac:picMkLst>
-            <pc:docMk/>
-            <pc:sldMk cId="0" sldId="265"/>
-            <ac:picMk id="2" creationId="{D493AA2A-78AD-4785-A256-2864A2982038}"/>
-          </ac:picMkLst>
-        </pc:picChg>
-        <pc:picChg chg="del">
-          <ac:chgData name="Wille Hyyryläinen" userId="S::t8hywi00@students.oamk.fi::9fbfb569-63a4-4b65-b166-7e5bac470419" providerId="AD" clId="Web-{7973B60B-7EA7-415D-955A-9004C881AFFF}" dt="2019-12-03T09:30:26.886" v="494"/>
-          <ac:picMkLst>
-            <pc:docMk/>
-            <pc:sldMk cId="0" sldId="265"/>
-            <ac:picMk id="21" creationId="{348C1985-ED46-4ED6-BA9C-17B091E2773C}"/>
-          </ac:picMkLst>
-        </pc:picChg>
-        <pc:picChg chg="mod">
-          <ac:chgData name="Wille Hyyryläinen" userId="S::t8hywi00@students.oamk.fi::9fbfb569-63a4-4b65-b166-7e5bac470419" providerId="AD" clId="Web-{7973B60B-7EA7-415D-955A-9004C881AFFF}" dt="2019-12-03T09:25:16.072" v="445" actId="1076"/>
-          <ac:picMkLst>
-            <pc:docMk/>
-            <pc:sldMk cId="0" sldId="265"/>
-            <ac:picMk id="25" creationId="{34CF2E5E-1127-407D-ADD8-9A88C2344D70}"/>
           </ac:picMkLst>
         </pc:picChg>
       </pc:sldChg>
@@ -423,6 +356,94 @@
     </pc:docChg>
   </pc:docChgLst>
   <pc:docChgLst>
+    <pc:chgData name="Wille Hyyryläinen" userId="S::t8hywi00@students.oamk.fi::9fbfb569-63a4-4b65-b166-7e5bac470419" providerId="AD" clId="Web-{7973B60B-7EA7-415D-955A-9004C881AFFF}"/>
+    <pc:docChg chg="modSld">
+      <pc:chgData name="Wille Hyyryläinen" userId="S::t8hywi00@students.oamk.fi::9fbfb569-63a4-4b65-b166-7e5bac470419" providerId="AD" clId="Web-{7973B60B-7EA7-415D-955A-9004C881AFFF}" dt="2019-12-03T09:32:37.308" v="497" actId="14100"/>
+      <pc:docMkLst>
+        <pc:docMk/>
+      </pc:docMkLst>
+      <pc:sldChg chg="addSp delSp modSp">
+        <pc:chgData name="Wille Hyyryläinen" userId="S::t8hywi00@students.oamk.fi::9fbfb569-63a4-4b65-b166-7e5bac470419" providerId="AD" clId="Web-{7973B60B-7EA7-415D-955A-9004C881AFFF}" dt="2019-12-03T09:32:37.308" v="497" actId="14100"/>
+        <pc:sldMkLst>
+          <pc:docMk/>
+          <pc:sldMk cId="0" sldId="265"/>
+        </pc:sldMkLst>
+        <pc:spChg chg="mod">
+          <ac:chgData name="Wille Hyyryläinen" userId="S::t8hywi00@students.oamk.fi::9fbfb569-63a4-4b65-b166-7e5bac470419" providerId="AD" clId="Web-{7973B60B-7EA7-415D-955A-9004C881AFFF}" dt="2019-12-03T09:14:33.962" v="1" actId="1076"/>
+          <ac:spMkLst>
+            <pc:docMk/>
+            <pc:sldMk cId="0" sldId="265"/>
+            <ac:spMk id="4" creationId="{00000000-0000-0000-0000-000000000000}"/>
+          </ac:spMkLst>
+        </pc:spChg>
+        <pc:spChg chg="mod">
+          <ac:chgData name="Wille Hyyryläinen" userId="S::t8hywi00@students.oamk.fi::9fbfb569-63a4-4b65-b166-7e5bac470419" providerId="AD" clId="Web-{7973B60B-7EA7-415D-955A-9004C881AFFF}" dt="2019-12-03T09:27:45.417" v="493" actId="20577"/>
+          <ac:spMkLst>
+            <pc:docMk/>
+            <pc:sldMk cId="0" sldId="265"/>
+            <ac:spMk id="9" creationId="{00000000-0000-0000-0000-000000000000}"/>
+          </ac:spMkLst>
+        </pc:spChg>
+        <pc:spChg chg="mod">
+          <ac:chgData name="Wille Hyyryläinen" userId="S::t8hywi00@students.oamk.fi::9fbfb569-63a4-4b65-b166-7e5bac470419" providerId="AD" clId="Web-{7973B60B-7EA7-415D-955A-9004C881AFFF}" dt="2019-12-03T09:27:04.135" v="490" actId="20577"/>
+          <ac:spMkLst>
+            <pc:docMk/>
+            <pc:sldMk cId="0" sldId="265"/>
+            <ac:spMk id="10" creationId="{00000000-0000-0000-0000-000000000000}"/>
+          </ac:spMkLst>
+        </pc:spChg>
+        <pc:picChg chg="add mod">
+          <ac:chgData name="Wille Hyyryläinen" userId="S::t8hywi00@students.oamk.fi::9fbfb569-63a4-4b65-b166-7e5bac470419" providerId="AD" clId="Web-{7973B60B-7EA7-415D-955A-9004C881AFFF}" dt="2019-12-03T09:32:37.308" v="497" actId="14100"/>
+          <ac:picMkLst>
+            <pc:docMk/>
+            <pc:sldMk cId="0" sldId="265"/>
+            <ac:picMk id="2" creationId="{D493AA2A-78AD-4785-A256-2864A2982038}"/>
+          </ac:picMkLst>
+        </pc:picChg>
+        <pc:picChg chg="del">
+          <ac:chgData name="Wille Hyyryläinen" userId="S::t8hywi00@students.oamk.fi::9fbfb569-63a4-4b65-b166-7e5bac470419" providerId="AD" clId="Web-{7973B60B-7EA7-415D-955A-9004C881AFFF}" dt="2019-12-03T09:30:26.886" v="494"/>
+          <ac:picMkLst>
+            <pc:docMk/>
+            <pc:sldMk cId="0" sldId="265"/>
+            <ac:picMk id="21" creationId="{348C1985-ED46-4ED6-BA9C-17B091E2773C}"/>
+          </ac:picMkLst>
+        </pc:picChg>
+        <pc:picChg chg="mod">
+          <ac:chgData name="Wille Hyyryläinen" userId="S::t8hywi00@students.oamk.fi::9fbfb569-63a4-4b65-b166-7e5bac470419" providerId="AD" clId="Web-{7973B60B-7EA7-415D-955A-9004C881AFFF}" dt="2019-12-03T09:25:16.072" v="445" actId="1076"/>
+          <ac:picMkLst>
+            <pc:docMk/>
+            <pc:sldMk cId="0" sldId="265"/>
+            <ac:picMk id="25" creationId="{34CF2E5E-1127-407D-ADD8-9A88C2344D70}"/>
+          </ac:picMkLst>
+        </pc:picChg>
+      </pc:sldChg>
+    </pc:docChg>
+  </pc:docChgLst>
+  <pc:docChgLst>
+    <pc:chgData name="Pekka Rajala" userId="b0a98724-b1e3-4f2e-b5db-ecf0f9bdda90" providerId="ADAL" clId="{D88D4DC1-78E0-40D2-AFEE-DA675AEAF22C}"/>
+    <pc:docChg chg="modSld">
+      <pc:chgData name="Pekka Rajala" userId="b0a98724-b1e3-4f2e-b5db-ecf0f9bdda90" providerId="ADAL" clId="{D88D4DC1-78E0-40D2-AFEE-DA675AEAF22C}" dt="2019-12-09T07:38:35.517" v="10" actId="20577"/>
+      <pc:docMkLst>
+        <pc:docMk/>
+      </pc:docMkLst>
+      <pc:sldChg chg="modSp">
+        <pc:chgData name="Pekka Rajala" userId="b0a98724-b1e3-4f2e-b5db-ecf0f9bdda90" providerId="ADAL" clId="{D88D4DC1-78E0-40D2-AFEE-DA675AEAF22C}" dt="2019-12-09T07:38:35.517" v="10" actId="20577"/>
+        <pc:sldMkLst>
+          <pc:docMk/>
+          <pc:sldMk cId="0" sldId="265"/>
+        </pc:sldMkLst>
+        <pc:spChg chg="mod">
+          <ac:chgData name="Pekka Rajala" userId="b0a98724-b1e3-4f2e-b5db-ecf0f9bdda90" providerId="ADAL" clId="{D88D4DC1-78E0-40D2-AFEE-DA675AEAF22C}" dt="2019-12-09T07:38:35.517" v="10" actId="20577"/>
+          <ac:spMkLst>
+            <pc:docMk/>
+            <pc:sldMk cId="0" sldId="265"/>
+            <ac:spMk id="31" creationId="{00000000-0000-0000-0000-000000000000}"/>
+          </ac:spMkLst>
+        </pc:spChg>
+      </pc:sldChg>
+    </pc:docChg>
+  </pc:docChgLst>
+  <pc:docChgLst>
     <pc:chgData name="Wille Hyyryläinen" userId="9fbfb569-63a4-4b65-b166-7e5bac470419" providerId="ADAL" clId="{D518F140-9D47-4F18-8BA5-1A86A95FD7AA}"/>
     <pc:docChg chg="custSel modSld">
       <pc:chgData name="Wille Hyyryläinen" userId="9fbfb569-63a4-4b65-b166-7e5bac470419" providerId="ADAL" clId="{D518F140-9D47-4F18-8BA5-1A86A95FD7AA}" dt="2019-12-03T13:43:56.580" v="1365" actId="20577"/>
@@ -580,7 +601,7 @@
             <a:fld id="{19EC9BF0-2C59-2C46-BBD9-7948B59DC01B}" type="datetime1">
               <a:rPr lang="fi-FI" smtClean="0"/>
               <a:pPr/>
-              <a:t>7.12.2019</a:t>
+              <a:t>9.12.2019</a:t>
             </a:fld>
             <a:endParaRPr lang="fi-FI"/>
           </a:p>
@@ -748,7 +769,7 @@
             <a:fld id="{0E4AA8A8-4D46-BD40-89BF-70B4CBE4D6DF}" type="datetime1">
               <a:rPr lang="fi-FI" smtClean="0"/>
               <a:pPr/>
-              <a:t>7.12.2019</a:t>
+              <a:t>9.12.2019</a:t>
             </a:fld>
             <a:endParaRPr lang="fi-FI"/>
           </a:p>
@@ -2597,12 +2618,8 @@
           </a:lstStyle>
           <a:p>
             <a:r>
-              <a:rPr lang="en-US" dirty="0" err="1"/>
-              <a:t>VarastoRobo</a:t>
-            </a:r>
-            <a:r>
-              <a:rPr lang="en-US" dirty="0"/>
-              <a:t> –project, master server and network communication </a:t>
+              <a:rPr lang="en-US"/>
+              <a:t>VarastoRobo – Master</a:t>
             </a:r>
           </a:p>
         </p:txBody>
@@ -2726,23 +2743,23 @@
           </a:lstStyle>
           <a:p>
             <a:r>
-              <a:rPr lang="en-US" dirty="0" err="1"/>
+              <a:rPr lang="en-US" err="1"/>
               <a:t>Santtu</a:t>
             </a:r>
             <a:r>
-              <a:rPr lang="en-US" dirty="0"/>
+              <a:rPr lang="en-US"/>
               <a:t> Nyman TVT17SPL</a:t>
             </a:r>
           </a:p>
           <a:p>
             <a:r>
-              <a:rPr lang="en-US" dirty="0"/>
+              <a:rPr lang="en-US"/>
               <a:t>Oulu University of Applied Sciences</a:t>
             </a:r>
           </a:p>
           <a:p>
             <a:r>
-              <a:rPr lang="en-US" dirty="0"/>
+              <a:rPr lang="en-US"/>
               <a:t>Information Technology, Option of Device and Product Design</a:t>
             </a:r>
           </a:p>
@@ -2816,7 +2833,7 @@
           <a:p>
             <a:r>
               <a:rPr lang="en-US" dirty="0"/>
-              <a:t>Design of the communication specification was done with transferred information, ease of implementation and code reuse on master server taken to consideration.</a:t>
+              <a:t>Design of the communication specification was done considering transferred information, ease of implementation and code reuse on master server.</a:t>
             </a:r>
           </a:p>
           <a:p>
@@ -2897,244 +2914,31 @@
           </a:p>
           <a:p>
             <a:r>
-              <a:rPr lang="fi-FI" dirty="0" err="1"/>
-              <a:t>Figure</a:t>
-            </a:r>
-            <a:r>
-              <a:rPr lang="fi-FI" dirty="0"/>
-              <a:t> 2.</a:t>
-            </a:r>
-          </a:p>
-          <a:p>
-            <a:r>
-              <a:rPr lang="fi-FI" dirty="0" err="1"/>
-              <a:t>The</a:t>
-            </a:r>
-            <a:r>
-              <a:rPr lang="fi-FI" dirty="0"/>
-              <a:t> </a:t>
-            </a:r>
-            <a:r>
-              <a:rPr lang="fi-FI" dirty="0" err="1"/>
-              <a:t>master</a:t>
-            </a:r>
-            <a:r>
-              <a:rPr lang="fi-FI" dirty="0"/>
-              <a:t> </a:t>
-            </a:r>
-            <a:r>
-              <a:rPr lang="fi-FI" dirty="0" err="1"/>
-              <a:t>server</a:t>
-            </a:r>
-            <a:r>
-              <a:rPr lang="fi-FI" dirty="0"/>
-              <a:t> </a:t>
-            </a:r>
-            <a:r>
-              <a:rPr lang="fi-FI" dirty="0" err="1"/>
-              <a:t>creates</a:t>
-            </a:r>
-            <a:r>
-              <a:rPr lang="fi-FI" dirty="0"/>
-              <a:t> </a:t>
-            </a:r>
-            <a:r>
-              <a:rPr lang="fi-FI" dirty="0" err="1"/>
-              <a:t>paths</a:t>
-            </a:r>
-            <a:r>
-              <a:rPr lang="fi-FI" dirty="0"/>
-              <a:t> for </a:t>
-            </a:r>
-            <a:r>
-              <a:rPr lang="fi-FI" dirty="0" err="1"/>
+              <a:rPr lang="en-GB" dirty="0"/>
+              <a:t>Figure 2.</a:t>
+            </a:r>
+          </a:p>
+          <a:p>
+            <a:r>
+              <a:rPr lang="en-GB" dirty="0"/>
+              <a:t>The master server creates paths for </a:t>
+            </a:r>
+            <a:r>
+              <a:rPr lang="en-GB" dirty="0" err="1"/>
               <a:t>GoPiGos</a:t>
             </a:r>
             <a:r>
-              <a:rPr lang="fi-FI" dirty="0"/>
-              <a:t> for </a:t>
-            </a:r>
-            <a:r>
-              <a:rPr lang="fi-FI" dirty="0" err="1"/>
-              <a:t>transporting</a:t>
-            </a:r>
-            <a:r>
-              <a:rPr lang="fi-FI" dirty="0"/>
-              <a:t> </a:t>
-            </a:r>
-            <a:r>
-              <a:rPr lang="fi-FI" dirty="0" err="1"/>
-              <a:t>items</a:t>
-            </a:r>
-            <a:r>
-              <a:rPr lang="fi-FI" dirty="0"/>
-              <a:t> </a:t>
-            </a:r>
-            <a:r>
-              <a:rPr lang="fi-FI" dirty="0" err="1"/>
-              <a:t>form</a:t>
-            </a:r>
-            <a:r>
-              <a:rPr lang="fi-FI" dirty="0"/>
-              <a:t> </a:t>
-            </a:r>
-            <a:r>
-              <a:rPr lang="fi-FI" dirty="0" err="1"/>
-              <a:t>the</a:t>
-            </a:r>
-            <a:r>
-              <a:rPr lang="fi-FI" dirty="0"/>
-              <a:t> </a:t>
-            </a:r>
-            <a:r>
-              <a:rPr lang="fi-FI" dirty="0" err="1"/>
-              <a:t>storage</a:t>
-            </a:r>
-            <a:r>
-              <a:rPr lang="fi-FI" dirty="0"/>
-              <a:t> to a </a:t>
-            </a:r>
-            <a:r>
-              <a:rPr lang="fi-FI" dirty="0" err="1"/>
-              <a:t>user</a:t>
-            </a:r>
-            <a:r>
-              <a:rPr lang="fi-FI" dirty="0"/>
-              <a:t>. </a:t>
-            </a:r>
-            <a:r>
-              <a:rPr lang="fi-FI" dirty="0" err="1"/>
-              <a:t>The</a:t>
-            </a:r>
-            <a:r>
-              <a:rPr lang="fi-FI" dirty="0"/>
-              <a:t> </a:t>
-            </a:r>
-            <a:r>
-              <a:rPr lang="fi-FI" dirty="0" err="1"/>
-              <a:t>master</a:t>
-            </a:r>
-            <a:r>
-              <a:rPr lang="fi-FI" dirty="0"/>
-              <a:t> </a:t>
-            </a:r>
-            <a:r>
-              <a:rPr lang="fi-FI" dirty="0" err="1"/>
-              <a:t>server</a:t>
-            </a:r>
-            <a:r>
-              <a:rPr lang="fi-FI" dirty="0"/>
-              <a:t> </a:t>
-            </a:r>
-            <a:r>
-              <a:rPr lang="fi-FI" dirty="0" err="1"/>
-              <a:t>transforms</a:t>
-            </a:r>
-            <a:r>
-              <a:rPr lang="fi-FI" dirty="0"/>
-              <a:t> data </a:t>
-            </a:r>
-            <a:r>
-              <a:rPr lang="fi-FI" dirty="0" err="1"/>
-              <a:t>that</a:t>
-            </a:r>
-            <a:r>
-              <a:rPr lang="fi-FI" dirty="0"/>
-              <a:t> </a:t>
-            </a:r>
-            <a:r>
-              <a:rPr lang="fi-FI" dirty="0" err="1"/>
-              <a:t>represents</a:t>
-            </a:r>
-            <a:r>
-              <a:rPr lang="fi-FI" dirty="0"/>
-              <a:t> </a:t>
-            </a:r>
-            <a:r>
-              <a:rPr lang="fi-FI" dirty="0" err="1"/>
-              <a:t>different</a:t>
-            </a:r>
-            <a:r>
-              <a:rPr lang="fi-FI" dirty="0"/>
-              <a:t> </a:t>
-            </a:r>
-            <a:r>
-              <a:rPr lang="fi-FI" dirty="0" err="1"/>
-              <a:t>parts</a:t>
-            </a:r>
-            <a:r>
-              <a:rPr lang="fi-FI" dirty="0"/>
-              <a:t> of </a:t>
-            </a:r>
-            <a:r>
-              <a:rPr lang="fi-FI" dirty="0" err="1"/>
-              <a:t>the</a:t>
-            </a:r>
-            <a:r>
-              <a:rPr lang="fi-FI" dirty="0"/>
-              <a:t> </a:t>
-            </a:r>
-            <a:r>
-              <a:rPr lang="fi-FI" dirty="0" err="1"/>
-              <a:t>system</a:t>
-            </a:r>
-            <a:r>
-              <a:rPr lang="fi-FI" dirty="0"/>
-              <a:t> to </a:t>
-            </a:r>
-            <a:r>
-              <a:rPr lang="fi-FI" dirty="0" err="1"/>
-              <a:t>grid</a:t>
-            </a:r>
-            <a:r>
-              <a:rPr lang="fi-FI" dirty="0"/>
-              <a:t> of open </a:t>
-            </a:r>
-            <a:r>
-              <a:rPr lang="fi-FI" dirty="0" err="1"/>
-              <a:t>cells</a:t>
-            </a:r>
-            <a:r>
-              <a:rPr lang="fi-FI" dirty="0"/>
-              <a:t> and </a:t>
-            </a:r>
-            <a:r>
-              <a:rPr lang="fi-FI" dirty="0" err="1"/>
-              <a:t>this</a:t>
-            </a:r>
-            <a:r>
-              <a:rPr lang="fi-FI" dirty="0"/>
-              <a:t> </a:t>
-            </a:r>
-            <a:r>
-              <a:rPr lang="fi-FI" dirty="0" err="1"/>
-              <a:t>grid</a:t>
-            </a:r>
-            <a:r>
-              <a:rPr lang="fi-FI" dirty="0"/>
-              <a:t> is </a:t>
-            </a:r>
-            <a:r>
-              <a:rPr lang="fi-FI" dirty="0" err="1"/>
-              <a:t>then</a:t>
-            </a:r>
-            <a:r>
-              <a:rPr lang="fi-FI" dirty="0"/>
-              <a:t> </a:t>
-            </a:r>
-            <a:r>
-              <a:rPr lang="fi-FI" dirty="0" err="1"/>
+              <a:rPr lang="en-GB" dirty="0"/>
+              <a:t> for transporting items form the storage to a user. The master server transforms data that represents different parts of the system to grid of open cells and this grid is then </a:t>
+            </a:r>
+            <a:r>
+              <a:rPr lang="en-GB" dirty="0" err="1"/>
               <a:t>transformet</a:t>
             </a:r>
             <a:r>
-              <a:rPr lang="fi-FI" dirty="0"/>
-              <a:t> to </a:t>
-            </a:r>
-            <a:r>
-              <a:rPr lang="fi-FI" dirty="0" err="1"/>
-              <a:t>distances</a:t>
-            </a:r>
-            <a:endParaRPr lang="fi-FI" dirty="0"/>
+              <a:rPr lang="en-GB" dirty="0"/>
+              <a:t> to distances</a:t>
+            </a:r>
           </a:p>
         </p:txBody>
       </p:sp>
@@ -3156,119 +2960,119 @@
           <a:lstStyle/>
           <a:p>
             <a:r>
-              <a:rPr lang="en-US" dirty="0"/>
+              <a:rPr lang="en-US"/>
               <a:t>to desired location, as seen in figure 2. these distance maps are used to create the paths of </a:t>
             </a:r>
             <a:r>
-              <a:rPr lang="en-US" dirty="0" err="1"/>
+              <a:rPr lang="en-US" err="1"/>
               <a:t>GoPiGos</a:t>
             </a:r>
             <a:r>
-              <a:rPr lang="en-US" dirty="0"/>
+              <a:rPr lang="en-US"/>
               <a:t>. </a:t>
             </a:r>
             <a:r>
-              <a:rPr lang="en-US" dirty="0" err="1"/>
+              <a:rPr lang="en-US" err="1"/>
               <a:t>GoPiGos</a:t>
             </a:r>
             <a:r>
-              <a:rPr lang="en-US" dirty="0"/>
+              <a:rPr lang="en-US"/>
               <a:t> are assigned different priorities for deciding how, devices drive around each other.</a:t>
             </a:r>
           </a:p>
           <a:p>
             <a:r>
-              <a:rPr lang="en-US" dirty="0"/>
+              <a:rPr lang="en-US"/>
               <a:t>Cross-platform JSON parser library was also created for reading configurations of the master server and to be later used in other projects.</a:t>
             </a:r>
           </a:p>
           <a:p>
-            <a:endParaRPr lang="en-US" b="1" dirty="0"/>
-          </a:p>
-          <a:p>
-            <a:r>
-              <a:rPr lang="en-US" b="1" dirty="0"/>
+            <a:endParaRPr lang="en-US" b="1"/>
+          </a:p>
+          <a:p>
+            <a:r>
+              <a:rPr lang="en-US" b="1"/>
               <a:t>Results</a:t>
             </a:r>
-            <a:endParaRPr lang="en-US" dirty="0"/>
-          </a:p>
-          <a:p>
-            <a:r>
-              <a:rPr lang="en-US" dirty="0"/>
+            <a:endParaRPr lang="en-US"/>
+          </a:p>
+          <a:p>
+            <a:r>
+              <a:rPr lang="en-US"/>
               <a:t>Shared communication specification was written, and master server software was written. The system worked as planned. </a:t>
             </a:r>
           </a:p>
           <a:p>
-            <a:endParaRPr lang="en-US" b="1" dirty="0"/>
-          </a:p>
-          <a:p>
-            <a:r>
-              <a:rPr lang="EN-US" b="1" dirty="0"/>
+            <a:endParaRPr lang="en-US" b="1"/>
+          </a:p>
+          <a:p>
+            <a:r>
+              <a:rPr lang="EN-US" b="1"/>
               <a:t>Conclusions</a:t>
             </a:r>
-            <a:endParaRPr lang="en-US" b="1" dirty="0"/>
-          </a:p>
-          <a:p>
-            <a:r>
-              <a:rPr lang="en-US" dirty="0"/>
+            <a:endParaRPr lang="en-US" b="1"/>
+          </a:p>
+          <a:p>
+            <a:r>
+              <a:rPr lang="en-US"/>
               <a:t>The development team learned valuable lessons working with much bigger team than in any previous projects. Experience working with asynchronous IO using sockets was gained with using then on the master server. JSON language’s syntax was learned while creating parser for it and, it’s practical use while using it for configuring the master server.</a:t>
             </a:r>
-            <a:endParaRPr lang="fi-FI" dirty="0"/>
-          </a:p>
-          <a:p>
-            <a:endParaRPr lang="en-US" b="1" dirty="0"/>
-          </a:p>
-          <a:p>
-            <a:r>
-              <a:rPr lang="EN-US" b="1" dirty="0"/>
+            <a:endParaRPr lang="fi-FI"/>
+          </a:p>
+          <a:p>
+            <a:endParaRPr lang="en-US" b="1"/>
+          </a:p>
+          <a:p>
+            <a:r>
+              <a:rPr lang="EN-US" b="1"/>
               <a:t>References</a:t>
             </a:r>
           </a:p>
           <a:p>
             <a:r>
-              <a:rPr lang="fi-FI" dirty="0"/>
+              <a:rPr lang="fi-FI"/>
               <a:t>GoPiGo3 </a:t>
             </a:r>
             <a:r>
-              <a:rPr lang="fi-FI" dirty="0" err="1"/>
+              <a:rPr lang="fi-FI" err="1"/>
               <a:t>website</a:t>
             </a:r>
             <a:r>
-              <a:rPr lang="fi-FI" dirty="0"/>
+              <a:rPr lang="fi-FI"/>
               <a:t>: </a:t>
             </a:r>
             <a:r>
-              <a:rPr lang="fi-FI" dirty="0">
+              <a:rPr lang="fi-FI">
                 <a:hlinkClick r:id="rId2"/>
               </a:rPr>
               <a:t>www.dexterindustries.com/gopigo3/</a:t>
             </a:r>
-            <a:endParaRPr lang="fi-FI" dirty="0"/>
-          </a:p>
-          <a:p>
-            <a:r>
-              <a:rPr lang="fi-FI" dirty="0"/>
+            <a:endParaRPr lang="fi-FI"/>
+          </a:p>
+          <a:p>
+            <a:r>
+              <a:rPr lang="fi-FI"/>
               <a:t>UR5 </a:t>
             </a:r>
             <a:r>
-              <a:rPr lang="fi-FI" dirty="0" err="1"/>
+              <a:rPr lang="fi-FI" err="1"/>
               <a:t>website</a:t>
             </a:r>
             <a:r>
-              <a:rPr lang="fi-FI" dirty="0"/>
+              <a:rPr lang="fi-FI"/>
               <a:t>: </a:t>
             </a:r>
             <a:r>
-              <a:rPr lang="fi-FI" dirty="0">
+              <a:rPr lang="fi-FI">
                 <a:hlinkClick r:id="rId3"/>
               </a:rPr>
               <a:t>www.universal-robots.com/products/ur5-robot/</a:t>
             </a:r>
-            <a:endParaRPr lang="fi-FI" dirty="0"/>
-          </a:p>
-          <a:p>
-            <a:r>
-              <a:rPr lang="fi-FI" dirty="0">
+            <a:endParaRPr lang="fi-FI"/>
+          </a:p>
+          <a:p>
+            <a:r>
+              <a:rPr lang="fi-FI">
                 <a:solidFill>
                   <a:schemeClr val="bg1"/>
                 </a:solidFill>
@@ -3277,7 +3081,7 @@
             </a:r>
           </a:p>
           <a:p>
-            <a:endParaRPr lang="fi-FI" dirty="0"/>
+            <a:endParaRPr lang="fi-FI"/>
           </a:p>
         </p:txBody>
       </p:sp>
@@ -3303,7 +3107,7 @@
         </p:blipFill>
         <p:spPr>
           <a:xfrm>
-            <a:off x="570861" y="8804452"/>
+            <a:off x="566986" y="8583472"/>
             <a:ext cx="2813821" cy="2287448"/>
           </a:xfrm>
           <a:prstGeom prst="rect">
@@ -4335,12 +4139,6 @@
 </file>
 
 <file path=customXml/item1.xml><?xml version="1.0" encoding="utf-8"?>
-<p:properties xmlns:p="http://schemas.microsoft.com/office/2006/metadata/properties" xmlns:xsi="http://www.w3.org/2001/XMLSchema-instance" xmlns:pc="http://schemas.microsoft.com/office/infopath/2007/PartnerControls">
-  <documentManagement/>
-</p:properties>
-</file>
-
-<file path=customXml/item2.xml><?xml version="1.0" encoding="utf-8"?>
 <ct:contentTypeSchema xmlns:ct="http://schemas.microsoft.com/office/2006/metadata/contentType" xmlns:ma="http://schemas.microsoft.com/office/2006/metadata/properties/metaAttributes" ct:_="" ma:_="" ma:contentTypeName="Asiakirja" ma:contentTypeID="0x0101002B6CD87F9A7D134B9E32576F0F588E7F" ma:contentTypeVersion="5" ma:contentTypeDescription="Luo uusi asiakirja." ma:contentTypeScope="" ma:versionID="0110fb4114636077ee9c3c249d4b8b76">
   <xsd:schema xmlns:xsd="http://www.w3.org/2001/XMLSchema" xmlns:xs="http://www.w3.org/2001/XMLSchema" xmlns:p="http://schemas.microsoft.com/office/2006/metadata/properties" xmlns:ns2="28debcd4-39cb-438e-8b7f-bfdcd8401b5c" targetNamespace="http://schemas.microsoft.com/office/2006/metadata/properties" ma:root="true" ma:fieldsID="bc53cf924de49afd8637895196858600" ns2:_="">
     <xsd:import namespace="28debcd4-39cb-438e-8b7f-bfdcd8401b5c"/>
@@ -4492,7 +4290,7 @@
 </ct:contentTypeSchema>
 </file>
 
-<file path=customXml/item3.xml><?xml version="1.0" encoding="utf-8"?>
+<file path=customXml/item2.xml><?xml version="1.0" encoding="utf-8"?>
 <?mso-contentType ?>
 <FormTemplates xmlns="http://schemas.microsoft.com/sharepoint/v3/contenttype/forms">
   <Display>DocumentLibraryForm</Display>
@@ -4501,44 +4299,50 @@
 </FormTemplates>
 </file>
 
+<file path=customXml/item3.xml><?xml version="1.0" encoding="utf-8"?>
+<p:properties xmlns:p="http://schemas.microsoft.com/office/2006/metadata/properties" xmlns:xsi="http://www.w3.org/2001/XMLSchema-instance" xmlns:pc="http://schemas.microsoft.com/office/infopath/2007/PartnerControls">
+  <documentManagement/>
+</p:properties>
+</file>
+
 <file path=customXml/itemProps1.xml><?xml version="1.0" encoding="utf-8"?>
-<ds:datastoreItem xmlns:ds="http://schemas.openxmlformats.org/officeDocument/2006/customXml" ds:itemID="{5E8E0F72-FEBC-47B1-AB6C-D6ECF4EB2481}">
+<ds:datastoreItem xmlns:ds="http://schemas.openxmlformats.org/officeDocument/2006/customXml" ds:itemID="{A3B53E1E-4149-4318-9FEF-2CD8F344F89C}">
   <ds:schemaRefs>
+    <ds:schemaRef ds:uri="28debcd4-39cb-438e-8b7f-bfdcd8401b5c"/>
+    <ds:schemaRef ds:uri="http://purl.org/dc/elements/1.1/"/>
+    <ds:schemaRef ds:uri="http://purl.org/dc/terms/"/>
+    <ds:schemaRef ds:uri="http://schemas.microsoft.com/internal/obd"/>
+    <ds:schemaRef ds:uri="http://schemas.microsoft.com/office/2006/documentManagement/types"/>
+    <ds:schemaRef ds:uri="http://schemas.microsoft.com/office/2006/metadata/contentType"/>
+    <ds:schemaRef ds:uri="http://schemas.microsoft.com/office/2006/metadata/properties"/>
+    <ds:schemaRef ds:uri="http://schemas.microsoft.com/office/2006/metadata/properties/metaAttributes"/>
     <ds:schemaRef ds:uri="http://schemas.microsoft.com/office/infopath/2007/PartnerControls"/>
-    <ds:schemaRef ds:uri="28debcd4-39cb-438e-8b7f-bfdcd8401b5c"/>
-    <ds:schemaRef ds:uri="http://purl.org/dc/dcmitype/"/>
-    <ds:schemaRef ds:uri="http://purl.org/dc/elements/1.1/"/>
-    <ds:schemaRef ds:uri="http://www.w3.org/XML/1998/namespace"/>
-    <ds:schemaRef ds:uri="http://schemas.microsoft.com/office/2006/documentManagement/types"/>
-    <ds:schemaRef ds:uri="http://purl.org/dc/terms/"/>
     <ds:schemaRef ds:uri="http://schemas.openxmlformats.org/package/2006/metadata/core-properties"/>
-    <ds:schemaRef ds:uri="http://schemas.microsoft.com/office/2006/metadata/properties"/>
+    <ds:schemaRef ds:uri="http://www.w3.org/2001/XMLSchema"/>
   </ds:schemaRefs>
 </ds:datastoreItem>
 </file>
 
 <file path=customXml/itemProps2.xml><?xml version="1.0" encoding="utf-8"?>
-<ds:datastoreItem xmlns:ds="http://schemas.openxmlformats.org/officeDocument/2006/customXml" ds:itemID="{A3B53E1E-4149-4318-9FEF-2CD8F344F89C}">
+<ds:datastoreItem xmlns:ds="http://schemas.openxmlformats.org/officeDocument/2006/customXml" ds:itemID="{E91F8943-9707-4090-BD36-37E33C8D0A92}">
   <ds:schemaRefs>
-    <ds:schemaRef ds:uri="http://schemas.microsoft.com/office/2006/metadata/contentType"/>
-    <ds:schemaRef ds:uri="http://schemas.microsoft.com/office/2006/metadata/properties/metaAttributes"/>
-    <ds:schemaRef ds:uri="http://www.w3.org/2001/XMLSchema"/>
-    <ds:schemaRef ds:uri="http://schemas.microsoft.com/office/2006/metadata/properties"/>
-    <ds:schemaRef ds:uri="28debcd4-39cb-438e-8b7f-bfdcd8401b5c"/>
-    <ds:schemaRef ds:uri="http://schemas.microsoft.com/office/2006/documentManagement/types"/>
-    <ds:schemaRef ds:uri="http://schemas.microsoft.com/office/infopath/2007/PartnerControls"/>
-    <ds:schemaRef ds:uri="http://schemas.openxmlformats.org/package/2006/metadata/core-properties"/>
-    <ds:schemaRef ds:uri="http://purl.org/dc/elements/1.1/"/>
-    <ds:schemaRef ds:uri="http://purl.org/dc/terms/"/>
-    <ds:schemaRef ds:uri="http://schemas.microsoft.com/internal/obd"/>
+    <ds:schemaRef ds:uri="http://schemas.microsoft.com/sharepoint/v3/contenttype/forms"/>
   </ds:schemaRefs>
 </ds:datastoreItem>
 </file>
 
 <file path=customXml/itemProps3.xml><?xml version="1.0" encoding="utf-8"?>
-<ds:datastoreItem xmlns:ds="http://schemas.openxmlformats.org/officeDocument/2006/customXml" ds:itemID="{E91F8943-9707-4090-BD36-37E33C8D0A92}">
+<ds:datastoreItem xmlns:ds="http://schemas.openxmlformats.org/officeDocument/2006/customXml" ds:itemID="{5E8E0F72-FEBC-47B1-AB6C-D6ECF4EB2481}">
   <ds:schemaRefs>
-    <ds:schemaRef ds:uri="http://schemas.microsoft.com/sharepoint/v3/contenttype/forms"/>
+    <ds:schemaRef ds:uri="28debcd4-39cb-438e-8b7f-bfdcd8401b5c"/>
+    <ds:schemaRef ds:uri="http://purl.org/dc/dcmitype/"/>
+    <ds:schemaRef ds:uri="http://purl.org/dc/elements/1.1/"/>
+    <ds:schemaRef ds:uri="http://purl.org/dc/terms/"/>
+    <ds:schemaRef ds:uri="http://schemas.microsoft.com/office/2006/documentManagement/types"/>
+    <ds:schemaRef ds:uri="http://schemas.microsoft.com/office/2006/metadata/properties"/>
+    <ds:schemaRef ds:uri="http://schemas.microsoft.com/office/infopath/2007/PartnerControls"/>
+    <ds:schemaRef ds:uri="http://schemas.openxmlformats.org/package/2006/metadata/core-properties"/>
+    <ds:schemaRef ds:uri="http://www.w3.org/XML/1998/namespace"/>
   </ds:schemaRefs>
 </ds:datastoreItem>
 </file>
</xml_diff>

<commit_message>
master server version 1.0.0
</commit_message>
<xml_diff>
--- a/poster/varastorobo_poster_nyman.pptx
+++ b/poster/varastorobo_poster_nyman.pptx
@@ -356,6 +356,30 @@
     </pc:docChg>
   </pc:docChgLst>
   <pc:docChgLst>
+    <pc:chgData name="Pekka Rajala" userId="b0a98724-b1e3-4f2e-b5db-ecf0f9bdda90" providerId="ADAL" clId="{D88D4DC1-78E0-40D2-AFEE-DA675AEAF22C}"/>
+    <pc:docChg chg="modSld">
+      <pc:chgData name="Pekka Rajala" userId="b0a98724-b1e3-4f2e-b5db-ecf0f9bdda90" providerId="ADAL" clId="{D88D4DC1-78E0-40D2-AFEE-DA675AEAF22C}" dt="2019-12-09T07:38:35.517" v="10" actId="20577"/>
+      <pc:docMkLst>
+        <pc:docMk/>
+      </pc:docMkLst>
+      <pc:sldChg chg="modSp">
+        <pc:chgData name="Pekka Rajala" userId="b0a98724-b1e3-4f2e-b5db-ecf0f9bdda90" providerId="ADAL" clId="{D88D4DC1-78E0-40D2-AFEE-DA675AEAF22C}" dt="2019-12-09T07:38:35.517" v="10" actId="20577"/>
+        <pc:sldMkLst>
+          <pc:docMk/>
+          <pc:sldMk cId="0" sldId="265"/>
+        </pc:sldMkLst>
+        <pc:spChg chg="mod">
+          <ac:chgData name="Pekka Rajala" userId="b0a98724-b1e3-4f2e-b5db-ecf0f9bdda90" providerId="ADAL" clId="{D88D4DC1-78E0-40D2-AFEE-DA675AEAF22C}" dt="2019-12-09T07:38:35.517" v="10" actId="20577"/>
+          <ac:spMkLst>
+            <pc:docMk/>
+            <pc:sldMk cId="0" sldId="265"/>
+            <ac:spMk id="31" creationId="{00000000-0000-0000-0000-000000000000}"/>
+          </ac:spMkLst>
+        </pc:spChg>
+      </pc:sldChg>
+    </pc:docChg>
+  </pc:docChgLst>
+  <pc:docChgLst>
     <pc:chgData name="Wille Hyyryläinen" userId="S::t8hywi00@students.oamk.fi::9fbfb569-63a4-4b65-b166-7e5bac470419" providerId="AD" clId="Web-{7973B60B-7EA7-415D-955A-9004C881AFFF}"/>
     <pc:docChg chg="modSld">
       <pc:chgData name="Wille Hyyryläinen" userId="S::t8hywi00@students.oamk.fi::9fbfb569-63a4-4b65-b166-7e5bac470419" providerId="AD" clId="Web-{7973B60B-7EA7-415D-955A-9004C881AFFF}" dt="2019-12-03T09:32:37.308" v="497" actId="14100"/>
@@ -416,30 +440,6 @@
             <ac:picMk id="25" creationId="{34CF2E5E-1127-407D-ADD8-9A88C2344D70}"/>
           </ac:picMkLst>
         </pc:picChg>
-      </pc:sldChg>
-    </pc:docChg>
-  </pc:docChgLst>
-  <pc:docChgLst>
-    <pc:chgData name="Pekka Rajala" userId="b0a98724-b1e3-4f2e-b5db-ecf0f9bdda90" providerId="ADAL" clId="{D88D4DC1-78E0-40D2-AFEE-DA675AEAF22C}"/>
-    <pc:docChg chg="modSld">
-      <pc:chgData name="Pekka Rajala" userId="b0a98724-b1e3-4f2e-b5db-ecf0f9bdda90" providerId="ADAL" clId="{D88D4DC1-78E0-40D2-AFEE-DA675AEAF22C}" dt="2019-12-09T07:38:35.517" v="10" actId="20577"/>
-      <pc:docMkLst>
-        <pc:docMk/>
-      </pc:docMkLst>
-      <pc:sldChg chg="modSp">
-        <pc:chgData name="Pekka Rajala" userId="b0a98724-b1e3-4f2e-b5db-ecf0f9bdda90" providerId="ADAL" clId="{D88D4DC1-78E0-40D2-AFEE-DA675AEAF22C}" dt="2019-12-09T07:38:35.517" v="10" actId="20577"/>
-        <pc:sldMkLst>
-          <pc:docMk/>
-          <pc:sldMk cId="0" sldId="265"/>
-        </pc:sldMkLst>
-        <pc:spChg chg="mod">
-          <ac:chgData name="Pekka Rajala" userId="b0a98724-b1e3-4f2e-b5db-ecf0f9bdda90" providerId="ADAL" clId="{D88D4DC1-78E0-40D2-AFEE-DA675AEAF22C}" dt="2019-12-09T07:38:35.517" v="10" actId="20577"/>
-          <ac:spMkLst>
-            <pc:docMk/>
-            <pc:sldMk cId="0" sldId="265"/>
-            <ac:spMk id="31" creationId="{00000000-0000-0000-0000-000000000000}"/>
-          </ac:spMkLst>
-        </pc:spChg>
       </pc:sldChg>
     </pc:docChg>
   </pc:docChgLst>
@@ -601,7 +601,7 @@
             <a:fld id="{19EC9BF0-2C59-2C46-BBD9-7948B59DC01B}" type="datetime1">
               <a:rPr lang="fi-FI" smtClean="0"/>
               <a:pPr/>
-              <a:t>9.12.2019</a:t>
+              <a:t>10.12.2019</a:t>
             </a:fld>
             <a:endParaRPr lang="fi-FI"/>
           </a:p>
@@ -769,7 +769,7 @@
             <a:fld id="{0E4AA8A8-4D46-BD40-89BF-70B4CBE4D6DF}" type="datetime1">
               <a:rPr lang="fi-FI" smtClean="0"/>
               <a:pPr/>
-              <a:t>9.12.2019</a:t>
+              <a:t>10.12.2019</a:t>
             </a:fld>
             <a:endParaRPr lang="fi-FI"/>
           </a:p>
@@ -2863,7 +2863,7 @@
           <a:p>
             <a:r>
               <a:rPr lang="en-US" dirty="0"/>
-              <a:t>Figure 1</a:t>
+              <a:t>Figure 1. communication between devices</a:t>
             </a:r>
           </a:p>
         </p:txBody>
@@ -2885,13 +2885,16 @@
           <a:p>
             <a:r>
               <a:rPr lang="en-US" dirty="0"/>
-              <a:t>To make devices work in co-operation, “master server” software was created to control all devices in the system. The master server is center of point of communication between different parts of the system, as seen in figure 1. The system uses both TCP and UDP for messaging.</a:t>
-            </a:r>
+              <a:t>To make devices work in co-operation, “master server” software was created to control all devices in the system. The master server is center of point of communication between different parts of the system, as seen in figure 1.</a:t>
+            </a:r>
+          </a:p>
+          <a:p>
+            <a:endParaRPr lang="en-US" dirty="0"/>
           </a:p>
           <a:p>
             <a:r>
               <a:rPr lang="en-US" dirty="0"/>
-              <a:t>The master server broadcasts information for user’s client software UDP messages. These broadcast messages are also used to uncover the master server’s IP address for other devices. All devices connect to the master server of the system using TCP connections. The TCP connection is used to transfer commands to control devices of the system and used to control the entire system from user’s client software.</a:t>
+              <a:t>The system uses both TCP and UDP for messaging. UDP is used for broadcasting to all devices in local network and TCP connection are used for one to one communication between the master server and other devices. The master server is single threaded, because it needs only little processing power, but communication between devices is done in parallel using asynchronous IO.</a:t>
             </a:r>
           </a:p>
           <a:p>
@@ -2904,18 +2907,21 @@
             <a:endParaRPr lang="en-US" dirty="0"/>
           </a:p>
           <a:p>
+            <a:endParaRPr lang="en-US" dirty="0"/>
+          </a:p>
+          <a:p>
+            <a:endParaRPr lang="en-US" dirty="0"/>
+          </a:p>
+          <a:p>
             <a:endParaRPr lang="fi-FI" dirty="0"/>
           </a:p>
           <a:p>
             <a:endParaRPr lang="fi-FI" dirty="0"/>
           </a:p>
           <a:p>
-            <a:endParaRPr lang="fi-FI" dirty="0"/>
-          </a:p>
-          <a:p>
             <a:r>
               <a:rPr lang="en-GB" dirty="0"/>
-              <a:t>Figure 2.</a:t>
+              <a:t>Figure 2. distance grid to target (x)</a:t>
             </a:r>
           </a:p>
           <a:p>
@@ -2929,15 +2935,13 @@
             </a:r>
             <a:r>
               <a:rPr lang="en-GB" dirty="0"/>
-              <a:t> for transporting items form the storage to a user. The master server transforms data that represents different parts of the system to grid of open cells and this grid is then </a:t>
-            </a:r>
-            <a:r>
-              <a:rPr lang="en-GB" dirty="0" err="1"/>
-              <a:t>transformet</a:t>
-            </a:r>
+              <a:t> for transporting items form the storage to a user.</a:t>
+            </a:r>
+          </a:p>
+          <a:p>
             <a:r>
               <a:rPr lang="en-GB" dirty="0"/>
-              <a:t> to distances</a:t>
+              <a:t>The master server transforms data that represents different parts of the system to grid of open cells and this</a:t>
             </a:r>
           </a:p>
         </p:txBody>
@@ -2960,128 +2964,71 @@
           <a:lstStyle/>
           <a:p>
             <a:r>
-              <a:rPr lang="en-US"/>
-              <a:t>to desired location, as seen in figure 2. these distance maps are used to create the paths of </a:t>
-            </a:r>
-            <a:r>
-              <a:rPr lang="en-US" err="1"/>
+              <a:rPr lang="en-GB" dirty="0"/>
+              <a:t>grid is then transformed to distances </a:t>
+            </a:r>
+            <a:r>
+              <a:rPr lang="en-US" dirty="0"/>
+              <a:t>to desired location, as seen in figure 2. These distance grids are used to create the paths of </a:t>
+            </a:r>
+            <a:r>
+              <a:rPr lang="en-US" dirty="0" err="1"/>
               <a:t>GoPiGos</a:t>
             </a:r>
             <a:r>
-              <a:rPr lang="en-US"/>
-              <a:t>. </a:t>
-            </a:r>
-            <a:r>
-              <a:rPr lang="en-US" err="1"/>
+              <a:rPr lang="en-US" dirty="0"/>
+              <a:t> as lists of directions. </a:t>
+            </a:r>
+            <a:r>
+              <a:rPr lang="en-US" dirty="0" err="1"/>
               <a:t>GoPiGos</a:t>
             </a:r>
             <a:r>
-              <a:rPr lang="en-US"/>
+              <a:rPr lang="en-US" dirty="0"/>
               <a:t> are assigned different priorities for deciding how, devices drive around each other.</a:t>
             </a:r>
           </a:p>
           <a:p>
-            <a:r>
-              <a:rPr lang="en-US"/>
+            <a:endParaRPr lang="en-US" dirty="0"/>
+          </a:p>
+          <a:p>
+            <a:r>
+              <a:rPr lang="en-US" dirty="0"/>
               <a:t>Cross-platform JSON parser library was also created for reading configurations of the master server and to be later used in other projects.</a:t>
             </a:r>
           </a:p>
           <a:p>
-            <a:endParaRPr lang="en-US" b="1"/>
-          </a:p>
-          <a:p>
-            <a:r>
-              <a:rPr lang="en-US" b="1"/>
+            <a:endParaRPr lang="en-US" b="1" dirty="0"/>
+          </a:p>
+          <a:p>
+            <a:r>
+              <a:rPr lang="en-US" b="1" dirty="0"/>
               <a:t>Results</a:t>
             </a:r>
-            <a:endParaRPr lang="en-US"/>
-          </a:p>
-          <a:p>
-            <a:r>
-              <a:rPr lang="en-US"/>
-              <a:t>Shared communication specification was written, and master server software was written. The system worked as planned. </a:t>
-            </a:r>
-          </a:p>
-          <a:p>
-            <a:endParaRPr lang="en-US" b="1"/>
-          </a:p>
-          <a:p>
-            <a:r>
-              <a:rPr lang="EN-US" b="1"/>
+            <a:endParaRPr lang="en-US" dirty="0"/>
+          </a:p>
+          <a:p>
+            <a:r>
+              <a:rPr lang="en-US" dirty="0"/>
+              <a:t>Shared communication specification was written and used as the basis for communication between devices, and master server software was written. The system worked as planned.</a:t>
+            </a:r>
+          </a:p>
+          <a:p>
+            <a:endParaRPr lang="en-US" b="1" dirty="0"/>
+          </a:p>
+          <a:p>
+            <a:r>
+              <a:rPr lang="EN-US" b="1" dirty="0"/>
               <a:t>Conclusions</a:t>
             </a:r>
-            <a:endParaRPr lang="en-US" b="1"/>
-          </a:p>
-          <a:p>
-            <a:r>
-              <a:rPr lang="en-US"/>
-              <a:t>The development team learned valuable lessons working with much bigger team than in any previous projects. Experience working with asynchronous IO using sockets was gained with using then on the master server. JSON language’s syntax was learned while creating parser for it and, it’s practical use while using it for configuring the master server.</a:t>
-            </a:r>
-            <a:endParaRPr lang="fi-FI"/>
-          </a:p>
-          <a:p>
-            <a:endParaRPr lang="en-US" b="1"/>
-          </a:p>
-          <a:p>
-            <a:r>
-              <a:rPr lang="EN-US" b="1"/>
-              <a:t>References</a:t>
-            </a:r>
-          </a:p>
-          <a:p>
-            <a:r>
-              <a:rPr lang="fi-FI"/>
-              <a:t>GoPiGo3 </a:t>
-            </a:r>
-            <a:r>
-              <a:rPr lang="fi-FI" err="1"/>
-              <a:t>website</a:t>
-            </a:r>
-            <a:r>
-              <a:rPr lang="fi-FI"/>
-              <a:t>: </a:t>
-            </a:r>
-            <a:r>
-              <a:rPr lang="fi-FI">
-                <a:hlinkClick r:id="rId2"/>
-              </a:rPr>
-              <a:t>www.dexterindustries.com/gopigo3/</a:t>
-            </a:r>
-            <a:endParaRPr lang="fi-FI"/>
-          </a:p>
-          <a:p>
-            <a:r>
-              <a:rPr lang="fi-FI"/>
-              <a:t>UR5 </a:t>
-            </a:r>
-            <a:r>
-              <a:rPr lang="fi-FI" err="1"/>
-              <a:t>website</a:t>
-            </a:r>
-            <a:r>
-              <a:rPr lang="fi-FI"/>
-              <a:t>: </a:t>
-            </a:r>
-            <a:r>
-              <a:rPr lang="fi-FI">
-                <a:hlinkClick r:id="rId3"/>
-              </a:rPr>
-              <a:t>www.universal-robots.com/products/ur5-robot/</a:t>
-            </a:r>
-            <a:endParaRPr lang="fi-FI"/>
-          </a:p>
-          <a:p>
-            <a:r>
-              <a:rPr lang="fi-FI">
-                <a:solidFill>
-                  <a:schemeClr val="bg1"/>
-                </a:solidFill>
-              </a:rPr>
-              <a:t>I DO NOT CARE ABOUT THIS REFERENCE TRASH</a:t>
-            </a:r>
-          </a:p>
-          <a:p>
-            <a:endParaRPr lang="fi-FI"/>
+            <a:endParaRPr lang="en-US" b="1" dirty="0"/>
+          </a:p>
+          <a:p>
+            <a:r>
+              <a:rPr lang="en-US" dirty="0"/>
+              <a:t>The development team learned valuable lessons working with much bigger team than in any previous projects. Experience working with asynchronous IO using sockets was gained with using then on the master server. JSON language’s syntax was learned while creating parser for it and, it’s practical use while using it for configuring the master server. Also writing the communication specification was interesting experience.</a:t>
+            </a:r>
+            <a:endParaRPr lang="fi-FI" dirty="0"/>
           </a:p>
         </p:txBody>
       </p:sp>
@@ -3100,7 +3047,7 @@
           <p:nvPr/>
         </p:nvPicPr>
         <p:blipFill>
-          <a:blip r:embed="rId4"/>
+          <a:blip r:embed="rId2"/>
           <a:stretch>
             <a:fillRect/>
           </a:stretch>
@@ -3130,14 +3077,14 @@
           <p:nvPr/>
         </p:nvPicPr>
         <p:blipFill>
-          <a:blip r:embed="rId5"/>
+          <a:blip r:embed="rId3"/>
           <a:stretch>
             <a:fillRect/>
           </a:stretch>
         </p:blipFill>
         <p:spPr>
           <a:xfrm>
-            <a:off x="3437892" y="7408408"/>
+            <a:off x="3494978" y="7465100"/>
             <a:ext cx="2829320" cy="1962424"/>
           </a:xfrm>
           <a:prstGeom prst="rect">
@@ -4139,6 +4086,21 @@
 </file>
 
 <file path=customXml/item1.xml><?xml version="1.0" encoding="utf-8"?>
+<p:properties xmlns:p="http://schemas.microsoft.com/office/2006/metadata/properties" xmlns:xsi="http://www.w3.org/2001/XMLSchema-instance" xmlns:pc="http://schemas.microsoft.com/office/infopath/2007/PartnerControls">
+  <documentManagement/>
+</p:properties>
+</file>
+
+<file path=customXml/item2.xml><?xml version="1.0" encoding="utf-8"?>
+<?mso-contentType ?>
+<FormTemplates xmlns="http://schemas.microsoft.com/sharepoint/v3/contenttype/forms">
+  <Display>DocumentLibraryForm</Display>
+  <Edit>DocumentLibraryForm</Edit>
+  <New>DocumentLibraryForm</New>
+</FormTemplates>
+</file>
+
+<file path=customXml/item3.xml><?xml version="1.0" encoding="utf-8"?>
 <ct:contentTypeSchema xmlns:ct="http://schemas.microsoft.com/office/2006/metadata/contentType" xmlns:ma="http://schemas.microsoft.com/office/2006/metadata/properties/metaAttributes" ct:_="" ma:_="" ma:contentTypeName="Asiakirja" ma:contentTypeID="0x0101002B6CD87F9A7D134B9E32576F0F588E7F" ma:contentTypeVersion="5" ma:contentTypeDescription="Luo uusi asiakirja." ma:contentTypeScope="" ma:versionID="0110fb4114636077ee9c3c249d4b8b76">
   <xsd:schema xmlns:xsd="http://www.w3.org/2001/XMLSchema" xmlns:xs="http://www.w3.org/2001/XMLSchema" xmlns:p="http://schemas.microsoft.com/office/2006/metadata/properties" xmlns:ns2="28debcd4-39cb-438e-8b7f-bfdcd8401b5c" targetNamespace="http://schemas.microsoft.com/office/2006/metadata/properties" ma:root="true" ma:fieldsID="bc53cf924de49afd8637895196858600" ns2:_="">
     <xsd:import namespace="28debcd4-39cb-438e-8b7f-bfdcd8401b5c"/>
@@ -4290,22 +4252,31 @@
 </ct:contentTypeSchema>
 </file>
 
-<file path=customXml/item2.xml><?xml version="1.0" encoding="utf-8"?>
-<?mso-contentType ?>
-<FormTemplates xmlns="http://schemas.microsoft.com/sharepoint/v3/contenttype/forms">
-  <Display>DocumentLibraryForm</Display>
-  <Edit>DocumentLibraryForm</Edit>
-  <New>DocumentLibraryForm</New>
-</FormTemplates>
+<file path=customXml/itemProps1.xml><?xml version="1.0" encoding="utf-8"?>
+<ds:datastoreItem xmlns:ds="http://schemas.openxmlformats.org/officeDocument/2006/customXml" ds:itemID="{5E8E0F72-FEBC-47B1-AB6C-D6ECF4EB2481}">
+  <ds:schemaRefs>
+    <ds:schemaRef ds:uri="28debcd4-39cb-438e-8b7f-bfdcd8401b5c"/>
+    <ds:schemaRef ds:uri="http://purl.org/dc/dcmitype/"/>
+    <ds:schemaRef ds:uri="http://purl.org/dc/elements/1.1/"/>
+    <ds:schemaRef ds:uri="http://purl.org/dc/terms/"/>
+    <ds:schemaRef ds:uri="http://schemas.microsoft.com/office/2006/documentManagement/types"/>
+    <ds:schemaRef ds:uri="http://schemas.microsoft.com/office/2006/metadata/properties"/>
+    <ds:schemaRef ds:uri="http://schemas.microsoft.com/office/infopath/2007/PartnerControls"/>
+    <ds:schemaRef ds:uri="http://schemas.openxmlformats.org/package/2006/metadata/core-properties"/>
+    <ds:schemaRef ds:uri="http://www.w3.org/XML/1998/namespace"/>
+  </ds:schemaRefs>
+</ds:datastoreItem>
 </file>
 
-<file path=customXml/item3.xml><?xml version="1.0" encoding="utf-8"?>
-<p:properties xmlns:p="http://schemas.microsoft.com/office/2006/metadata/properties" xmlns:xsi="http://www.w3.org/2001/XMLSchema-instance" xmlns:pc="http://schemas.microsoft.com/office/infopath/2007/PartnerControls">
-  <documentManagement/>
-</p:properties>
+<file path=customXml/itemProps2.xml><?xml version="1.0" encoding="utf-8"?>
+<ds:datastoreItem xmlns:ds="http://schemas.openxmlformats.org/officeDocument/2006/customXml" ds:itemID="{E91F8943-9707-4090-BD36-37E33C8D0A92}">
+  <ds:schemaRefs>
+    <ds:schemaRef ds:uri="http://schemas.microsoft.com/sharepoint/v3/contenttype/forms"/>
+  </ds:schemaRefs>
+</ds:datastoreItem>
 </file>
 
-<file path=customXml/itemProps1.xml><?xml version="1.0" encoding="utf-8"?>
+<file path=customXml/itemProps3.xml><?xml version="1.0" encoding="utf-8"?>
 <ds:datastoreItem xmlns:ds="http://schemas.openxmlformats.org/officeDocument/2006/customXml" ds:itemID="{A3B53E1E-4149-4318-9FEF-2CD8F344F89C}">
   <ds:schemaRefs>
     <ds:schemaRef ds:uri="28debcd4-39cb-438e-8b7f-bfdcd8401b5c"/>
@@ -4321,28 +4292,4 @@
     <ds:schemaRef ds:uri="http://www.w3.org/2001/XMLSchema"/>
   </ds:schemaRefs>
 </ds:datastoreItem>
-</file>
-
-<file path=customXml/itemProps2.xml><?xml version="1.0" encoding="utf-8"?>
-<ds:datastoreItem xmlns:ds="http://schemas.openxmlformats.org/officeDocument/2006/customXml" ds:itemID="{E91F8943-9707-4090-BD36-37E33C8D0A92}">
-  <ds:schemaRefs>
-    <ds:schemaRef ds:uri="http://schemas.microsoft.com/sharepoint/v3/contenttype/forms"/>
-  </ds:schemaRefs>
-</ds:datastoreItem>
-</file>
-
-<file path=customXml/itemProps3.xml><?xml version="1.0" encoding="utf-8"?>
-<ds:datastoreItem xmlns:ds="http://schemas.openxmlformats.org/officeDocument/2006/customXml" ds:itemID="{5E8E0F72-FEBC-47B1-AB6C-D6ECF4EB2481}">
-  <ds:schemaRefs>
-    <ds:schemaRef ds:uri="28debcd4-39cb-438e-8b7f-bfdcd8401b5c"/>
-    <ds:schemaRef ds:uri="http://purl.org/dc/dcmitype/"/>
-    <ds:schemaRef ds:uri="http://purl.org/dc/elements/1.1/"/>
-    <ds:schemaRef ds:uri="http://purl.org/dc/terms/"/>
-    <ds:schemaRef ds:uri="http://schemas.microsoft.com/office/2006/documentManagement/types"/>
-    <ds:schemaRef ds:uri="http://schemas.microsoft.com/office/2006/metadata/properties"/>
-    <ds:schemaRef ds:uri="http://schemas.microsoft.com/office/infopath/2007/PartnerControls"/>
-    <ds:schemaRef ds:uri="http://schemas.openxmlformats.org/package/2006/metadata/core-properties"/>
-    <ds:schemaRef ds:uri="http://www.w3.org/XML/1998/namespace"/>
-  </ds:schemaRefs>
-</ds:datastoreItem>
 </file>
</xml_diff>